<commit_message>
Set up slides for tutorial revision
</commit_message>
<xml_diff>
--- a/version1/slides/bda4sci.pptx
+++ b/version1/slides/bda4sci.pptx
@@ -254,7 +254,7 @@
           <a:p>
             <a:fld id="{932107E3-02B0-4F32-9595-48F976375028}" type="datetimeFigureOut">
               <a:rPr lang="en-US" smtClean="0"/>
-              <a:t>10/18/2024</a:t>
+              <a:t>4/3/2025</a:t>
             </a:fld>
             <a:endParaRPr lang="en-US"/>
           </a:p>
@@ -12927,12 +12927,16 @@
                 <a:buNone/>
               </a:pPr>
               <a:r>
-                <a:rPr lang="en-US" sz="2000" b="1" dirty="0"/>
-                <a:t>Problem</a:t>
+                <a:rPr lang="en-US" sz="2000" b="1"/>
+                <a:t>Goal</a:t>
+              </a:r>
+              <a:r>
+                <a:rPr lang="en-US" sz="2000"/>
+                <a:t>: </a:t>
               </a:r>
               <a:r>
                 <a:rPr lang="en-US" sz="2000" dirty="0"/>
-                <a:t>: This tutorial is aimed at academics that aim to tackle causal questions but lack the tools for it.</a:t>
+                <a:t>This tutorial is aimed at academics that aim to tackle causal questions but lack the tools for it.</a:t>
               </a:r>
             </a:p>
           </p:txBody>
@@ -14746,8 +14750,8 @@
           </a:p>
         </p:txBody>
       </p:sp>
-      <mc:AlternateContent xmlns:mc="http://schemas.openxmlformats.org/markup-compatibility/2006">
-        <mc:Choice xmlns:a14="http://schemas.microsoft.com/office/drawing/2010/main" Requires="a14">
+      <mc:AlternateContent xmlns:mc="http://schemas.openxmlformats.org/markup-compatibility/2006" xmlns:a14="http://schemas.microsoft.com/office/drawing/2010/main">
+        <mc:Choice Requires="a14">
           <p:sp>
             <p:nvSpPr>
               <p:cNvPr id="9" name="Content Placeholder 8">
@@ -14838,7 +14842,7 @@
             </p:txBody>
           </p:sp>
         </mc:Choice>
-        <mc:Fallback>
+        <mc:Fallback xmlns="">
           <p:sp>
             <p:nvSpPr>
               <p:cNvPr id="9" name="Content Placeholder 8">

</xml_diff>